<commit_message>
Added legend to UI process chart
</commit_message>
<xml_diff>
--- a/ExampleFunctionality/UIEngineTest/ExampleUIProcess.pptx
+++ b/ExampleFunctionality/UIEngineTest/ExampleUIProcess.pptx
@@ -107,6 +107,11 @@
       </a:defRPr>
     </a:lvl9pPr>
   </p:defaultTextStyle>
+  <p:extLst>
+    <p:ext uri="{EFAFB233-063F-42B5-8137-9DF3F51BA10A}">
+      <p15:sldGuideLst xmlns:p15="http://schemas.microsoft.com/office/powerpoint/2012/main"/>
+    </p:ext>
+  </p:extLst>
 </p:presentation>
 </file>
 
@@ -4456,6 +4461,268 @@
           </a:fontRef>
         </p:style>
       </p:cxnSp>
+      <p:sp>
+        <p:nvSpPr>
+          <p:cNvPr id="30" name="Oval 29"/>
+          <p:cNvSpPr/>
+          <p:nvPr/>
+        </p:nvSpPr>
+        <p:spPr>
+          <a:xfrm>
+            <a:off x="8860058" y="634658"/>
+            <a:ext cx="467204" cy="467204"/>
+          </a:xfrm>
+          <a:prstGeom prst="ellipse">
+            <a:avLst/>
+          </a:prstGeom>
+        </p:spPr>
+        <p:style>
+          <a:lnRef idx="2">
+            <a:schemeClr val="accent2">
+              <a:shade val="50000"/>
+            </a:schemeClr>
+          </a:lnRef>
+          <a:fillRef idx="1">
+            <a:schemeClr val="accent2"/>
+          </a:fillRef>
+          <a:effectRef idx="0">
+            <a:schemeClr val="accent2"/>
+          </a:effectRef>
+          <a:fontRef idx="minor">
+            <a:schemeClr val="lt1"/>
+          </a:fontRef>
+        </p:style>
+        <p:txBody>
+          <a:bodyPr rtlCol="0" anchor="ctr"/>
+          <a:lstStyle/>
+          <a:p>
+            <a:pPr algn="ctr"/>
+            <a:endParaRPr lang="en-GB" sz="300" dirty="0"/>
+          </a:p>
+        </p:txBody>
+      </p:sp>
+      <p:sp>
+        <p:nvSpPr>
+          <p:cNvPr id="32" name="Flowchart: Decision 31"/>
+          <p:cNvSpPr/>
+          <p:nvPr/>
+        </p:nvSpPr>
+        <p:spPr>
+          <a:xfrm>
+            <a:off x="8860058" y="1262555"/>
+            <a:ext cx="467204" cy="210130"/>
+          </a:xfrm>
+          <a:prstGeom prst="flowChartDecision">
+            <a:avLst/>
+          </a:prstGeom>
+        </p:spPr>
+        <p:style>
+          <a:lnRef idx="2">
+            <a:schemeClr val="accent4">
+              <a:shade val="50000"/>
+            </a:schemeClr>
+          </a:lnRef>
+          <a:fillRef idx="1">
+            <a:schemeClr val="accent4"/>
+          </a:fillRef>
+          <a:effectRef idx="0">
+            <a:schemeClr val="accent4"/>
+          </a:effectRef>
+          <a:fontRef idx="minor">
+            <a:schemeClr val="lt1"/>
+          </a:fontRef>
+        </p:style>
+        <p:txBody>
+          <a:bodyPr rtlCol="0" anchor="ctr"/>
+          <a:lstStyle/>
+          <a:p>
+            <a:pPr algn="ctr"/>
+            <a:endParaRPr lang="en-GB" sz="800" dirty="0">
+              <a:solidFill>
+                <a:sysClr val="windowText" lastClr="000000"/>
+              </a:solidFill>
+            </a:endParaRPr>
+          </a:p>
+        </p:txBody>
+      </p:sp>
+      <p:sp>
+        <p:nvSpPr>
+          <p:cNvPr id="33" name="Rectangle 32"/>
+          <p:cNvSpPr/>
+          <p:nvPr/>
+        </p:nvSpPr>
+        <p:spPr>
+          <a:xfrm>
+            <a:off x="8870288" y="1633378"/>
+            <a:ext cx="446744" cy="207916"/>
+          </a:xfrm>
+          <a:prstGeom prst="rect">
+            <a:avLst/>
+          </a:prstGeom>
+        </p:spPr>
+        <p:style>
+          <a:lnRef idx="2">
+            <a:schemeClr val="accent6">
+              <a:shade val="50000"/>
+            </a:schemeClr>
+          </a:lnRef>
+          <a:fillRef idx="1">
+            <a:schemeClr val="accent6"/>
+          </a:fillRef>
+          <a:effectRef idx="0">
+            <a:schemeClr val="accent6"/>
+          </a:effectRef>
+          <a:fontRef idx="minor">
+            <a:schemeClr val="lt1"/>
+          </a:fontRef>
+        </p:style>
+        <p:txBody>
+          <a:bodyPr rtlCol="0" anchor="ctr"/>
+          <a:lstStyle/>
+          <a:p>
+            <a:pPr algn="ctr"/>
+            <a:endParaRPr lang="en-GB" sz="1200" dirty="0">
+              <a:solidFill>
+                <a:sysClr val="windowText" lastClr="000000"/>
+              </a:solidFill>
+            </a:endParaRPr>
+          </a:p>
+        </p:txBody>
+      </p:sp>
+      <p:sp>
+        <p:nvSpPr>
+          <p:cNvPr id="2" name="Rectangle 1"/>
+          <p:cNvSpPr/>
+          <p:nvPr/>
+        </p:nvSpPr>
+        <p:spPr>
+          <a:xfrm>
+            <a:off x="8510626" y="453005"/>
+            <a:ext cx="2638344" cy="1682423"/>
+          </a:xfrm>
+          <a:prstGeom prst="rect">
+            <a:avLst/>
+          </a:prstGeom>
+          <a:noFill/>
+          <a:ln>
+            <a:solidFill>
+              <a:schemeClr val="tx1"/>
+            </a:solidFill>
+            <a:prstDash val="dash"/>
+          </a:ln>
+        </p:spPr>
+        <p:style>
+          <a:lnRef idx="2">
+            <a:schemeClr val="accent1">
+              <a:shade val="50000"/>
+            </a:schemeClr>
+          </a:lnRef>
+          <a:fillRef idx="1">
+            <a:schemeClr val="accent1"/>
+          </a:fillRef>
+          <a:effectRef idx="0">
+            <a:schemeClr val="accent1"/>
+          </a:effectRef>
+          <a:fontRef idx="minor">
+            <a:schemeClr val="lt1"/>
+          </a:fontRef>
+        </p:style>
+        <p:txBody>
+          <a:bodyPr rtlCol="0" anchor="ctr"/>
+          <a:lstStyle/>
+          <a:p>
+            <a:pPr algn="ctr"/>
+            <a:endParaRPr lang="en-GB"/>
+          </a:p>
+        </p:txBody>
+      </p:sp>
+      <p:sp>
+        <p:nvSpPr>
+          <p:cNvPr id="3" name="TextBox 2"/>
+          <p:cNvSpPr txBox="1"/>
+          <p:nvPr/>
+        </p:nvSpPr>
+        <p:spPr>
+          <a:xfrm>
+            <a:off x="9676694" y="683647"/>
+            <a:ext cx="1010790" cy="369332"/>
+          </a:xfrm>
+          <a:prstGeom prst="rect">
+            <a:avLst/>
+          </a:prstGeom>
+          <a:noFill/>
+        </p:spPr>
+        <p:txBody>
+          <a:bodyPr wrap="none" rtlCol="0">
+            <a:spAutoFit/>
+          </a:bodyPr>
+          <a:lstStyle/>
+          <a:p>
+            <a:r>
+              <a:rPr lang="en-GB" dirty="0"/>
+              <a:t>UI States</a:t>
+            </a:r>
+          </a:p>
+        </p:txBody>
+      </p:sp>
+      <p:sp>
+        <p:nvSpPr>
+          <p:cNvPr id="36" name="TextBox 35"/>
+          <p:cNvSpPr txBox="1"/>
+          <p:nvPr/>
+        </p:nvSpPr>
+        <p:spPr>
+          <a:xfrm>
+            <a:off x="9676694" y="1116366"/>
+            <a:ext cx="1189749" cy="369332"/>
+          </a:xfrm>
+          <a:prstGeom prst="rect">
+            <a:avLst/>
+          </a:prstGeom>
+          <a:noFill/>
+        </p:spPr>
+        <p:txBody>
+          <a:bodyPr wrap="none" rtlCol="0">
+            <a:spAutoFit/>
+          </a:bodyPr>
+          <a:lstStyle/>
+          <a:p>
+            <a:r>
+              <a:rPr lang="en-GB" dirty="0"/>
+              <a:t>Conditions</a:t>
+            </a:r>
+          </a:p>
+        </p:txBody>
+      </p:sp>
+      <p:sp>
+        <p:nvSpPr>
+          <p:cNvPr id="38" name="TextBox 37"/>
+          <p:cNvSpPr txBox="1"/>
+          <p:nvPr/>
+        </p:nvSpPr>
+        <p:spPr>
+          <a:xfrm>
+            <a:off x="9676694" y="1549085"/>
+            <a:ext cx="1364476" cy="369332"/>
+          </a:xfrm>
+          <a:prstGeom prst="rect">
+            <a:avLst/>
+          </a:prstGeom>
+          <a:noFill/>
+        </p:spPr>
+        <p:txBody>
+          <a:bodyPr wrap="none" rtlCol="0">
+            <a:spAutoFit/>
+          </a:bodyPr>
+          <a:lstStyle/>
+          <a:p>
+            <a:r>
+              <a:rPr lang="en-GB" dirty="0"/>
+              <a:t>User Actions</a:t>
+            </a:r>
+          </a:p>
+        </p:txBody>
+      </p:sp>
     </p:spTree>
     <p:extLst>
       <p:ext uri="{BB962C8B-B14F-4D97-AF65-F5344CB8AC3E}">

</xml_diff>